<commit_message>
fixed glitches in 12-interp
</commit_message>
<xml_diff>
--- a/Slides/Lesson 12.1 The Last Lecture.pptx
+++ b/Slides/Lesson 12.1 The Last Lecture.pptx
@@ -253,7 +253,7 @@
             <a:fld id="{3AEE8EC1-C4AE-4A57-9A8B-A8BF77FA5568}" type="datetimeFigureOut">
               <a:rPr lang="en-US" smtClean="0"/>
               <a:pPr/>
-              <a:t>11/21/2016</a:t>
+              <a:t>12/6/2016</a:t>
             </a:fld>
             <a:endParaRPr lang="en-US"/>
           </a:p>
@@ -2498,7 +2498,7 @@
           <a:p>
             <a:fld id="{2F1F79F5-7BEC-496A-AFC7-876E38F64D71}" type="datetime1">
               <a:rPr lang="en-US" smtClean="0"/>
-              <a:t>11/21/2016</a:t>
+              <a:t>12/6/2016</a:t>
             </a:fld>
             <a:endParaRPr lang="en-US"/>
           </a:p>
@@ -2615,7 +2615,7 @@
           <a:p>
             <a:fld id="{2F7B77F5-1464-4F6B-92A8-64FC8A508293}" type="datetime1">
               <a:rPr lang="en-US" smtClean="0"/>
-              <a:t>11/21/2016</a:t>
+              <a:t>12/6/2016</a:t>
             </a:fld>
             <a:endParaRPr lang="en-US"/>
           </a:p>
@@ -2710,7 +2710,7 @@
           <a:p>
             <a:fld id="{0A05703A-7669-4FEA-9056-25299B4D29D4}" type="datetime1">
               <a:rPr lang="en-US" smtClean="0"/>
-              <a:t>11/21/2016</a:t>
+              <a:t>12/6/2016</a:t>
             </a:fld>
             <a:endParaRPr lang="en-US"/>
           </a:p>
@@ -2985,7 +2985,7 @@
           <a:p>
             <a:fld id="{6E5077B5-BB57-49DB-88CA-226A139E5C01}" type="datetime1">
               <a:rPr lang="en-US" smtClean="0"/>
-              <a:t>11/21/2016</a:t>
+              <a:t>12/6/2016</a:t>
             </a:fld>
             <a:endParaRPr lang="en-US"/>
           </a:p>
@@ -3237,7 +3237,7 @@
           <a:p>
             <a:fld id="{C48D9447-CBD6-49A1-89FD-8512A8CF8999}" type="datetime1">
               <a:rPr lang="en-US" smtClean="0"/>
-              <a:t>11/21/2016</a:t>
+              <a:t>12/6/2016</a:t>
             </a:fld>
             <a:endParaRPr lang="en-US"/>
           </a:p>
@@ -3405,7 +3405,7 @@
           <a:p>
             <a:fld id="{A3639A2A-823D-48B7-9ACE-7FAF42870BA9}" type="datetime1">
               <a:rPr lang="en-US" smtClean="0"/>
-              <a:t>11/21/2016</a:t>
+              <a:t>12/6/2016</a:t>
             </a:fld>
             <a:endParaRPr lang="en-US"/>
           </a:p>
@@ -3583,7 +3583,7 @@
           <a:p>
             <a:fld id="{ED1B6996-82E9-463C-972C-7B56056E426C}" type="datetime1">
               <a:rPr lang="en-US" smtClean="0"/>
-              <a:t>11/21/2016</a:t>
+              <a:t>12/6/2016</a:t>
             </a:fld>
             <a:endParaRPr lang="en-US"/>
           </a:p>
@@ -3757,7 +3757,7 @@
           <a:p>
             <a:fld id="{E22ED4DA-448D-4BB1-B935-CC112220207B}" type="datetime1">
               <a:rPr lang="en-US" smtClean="0"/>
-              <a:t>11/21/2016</a:t>
+              <a:t>12/6/2016</a:t>
             </a:fld>
             <a:endParaRPr lang="en-US"/>
           </a:p>
@@ -3930,7 +3930,7 @@
           <a:p>
             <a:fld id="{E22ED4DA-448D-4BB1-B935-CC112220207B}" type="datetime1">
               <a:rPr lang="en-US" smtClean="0"/>
-              <a:t>11/21/2016</a:t>
+              <a:t>12/6/2016</a:t>
             </a:fld>
             <a:endParaRPr lang="en-US"/>
           </a:p>
@@ -4193,7 +4193,7 @@
           <a:p>
             <a:fld id="{FF5D65A6-AB94-4435-B0B7-3743215FA46C}" type="datetime1">
               <a:rPr lang="en-US" smtClean="0"/>
-              <a:t>11/21/2016</a:t>
+              <a:t>12/6/2016</a:t>
             </a:fld>
             <a:endParaRPr lang="en-US"/>
           </a:p>
@@ -4369,7 +4369,7 @@
           <a:p>
             <a:fld id="{FF5D65A6-AB94-4435-B0B7-3743215FA46C}" type="datetime1">
               <a:rPr lang="en-US" smtClean="0"/>
-              <a:t>11/21/2016</a:t>
+              <a:t>12/6/2016</a:t>
             </a:fld>
             <a:endParaRPr lang="en-US"/>
           </a:p>
@@ -4663,7 +4663,7 @@
           <a:p>
             <a:fld id="{7C193DC4-6EF0-48C9-B29C-616106A645E1}" type="datetime1">
               <a:rPr lang="en-US" smtClean="0"/>
-              <a:t>11/21/2016</a:t>
+              <a:t>12/6/2016</a:t>
             </a:fld>
             <a:endParaRPr lang="en-US"/>
           </a:p>
@@ -4948,7 +4948,7 @@
           <a:p>
             <a:fld id="{5D1846AD-9252-4647-9435-4C2AC365653A}" type="datetime1">
               <a:rPr lang="en-US" smtClean="0"/>
-              <a:t>11/21/2016</a:t>
+              <a:t>12/6/2016</a:t>
             </a:fld>
             <a:endParaRPr lang="en-US"/>
           </a:p>
@@ -5247,7 +5247,7 @@
           <a:p>
             <a:fld id="{5D1846AD-9252-4647-9435-4C2AC365653A}" type="datetime1">
               <a:rPr lang="en-US" smtClean="0"/>
-              <a:t>11/21/2016</a:t>
+              <a:t>12/6/2016</a:t>
             </a:fld>
             <a:endParaRPr lang="en-US"/>
           </a:p>
@@ -5666,7 +5666,7 @@
           <a:p>
             <a:fld id="{CE56DC10-3561-4063-A6AF-C1CC7A41040A}" type="datetime1">
               <a:rPr lang="en-US" smtClean="0"/>
-              <a:t>11/21/2016</a:t>
+              <a:t>12/6/2016</a:t>
             </a:fld>
             <a:endParaRPr lang="en-US"/>
           </a:p>
@@ -5889,7 +5889,7 @@
           <a:p>
             <a:fld id="{02B3F677-983B-48DB-ADFD-63FE6CBC7FB2}" type="datetime1">
               <a:rPr lang="en-US" smtClean="0"/>
-              <a:t>11/21/2016</a:t>
+              <a:t>12/6/2016</a:t>
             </a:fld>
             <a:endParaRPr lang="en-US"/>
           </a:p>
@@ -6921,12 +6921,14 @@
             <a:avLst/>
           </a:prstGeom>
           <a:solidFill>
-            <a:schemeClr val="accent3">
-              <a:lumMod val="40000"/>
-              <a:lumOff val="60000"/>
+            <a:schemeClr val="accent1">
+              <a:lumMod val="20000"/>
+              <a:lumOff val="80000"/>
             </a:schemeClr>
           </a:solidFill>
-          <a:ln/>
+          <a:ln>
+            <a:noFill/>
+          </a:ln>
         </p:spPr>
         <p:style>
           <a:lnRef idx="2">
@@ -14669,14 +14671,14 @@
             <p:ph idx="4294967295"/>
             <p:extLst>
               <p:ext uri="{D42A27DB-BD31-4B8C-83A1-F6EECF244321}">
-                <p14:modId xmlns:p14="http://schemas.microsoft.com/office/powerpoint/2010/main" val="1643938419"/>
+                <p14:modId xmlns:p14="http://schemas.microsoft.com/office/powerpoint/2010/main" val="2573500650"/>
               </p:ext>
             </p:extLst>
           </p:nvPr>
         </p:nvGraphicFramePr>
         <p:xfrm>
           <a:off x="990600" y="625793"/>
-          <a:ext cx="7086600" cy="5585460"/>
+          <a:ext cx="7086600" cy="5768340"/>
         </p:xfrm>
         <a:graphic>
           <a:graphicData uri="http://schemas.openxmlformats.org/drawingml/2006/table">
@@ -14721,7 +14723,7 @@
                     <a:lstStyle/>
                     <a:p>
                       <a:r>
-                        <a:rPr lang="en-US" dirty="0"/>
+                        <a:rPr lang="en-US" sz="2000" dirty="0"/>
                         <a:t>1.  Write programs that people can read, understand, and modify.</a:t>
                       </a:r>
                     </a:p>
@@ -14741,14 +14743,14 @@
                     <a:lstStyle/>
                     <a:p>
                       <a:r>
-                        <a:rPr lang="en-US" dirty="0"/>
+                        <a:rPr lang="en-US" sz="2000" dirty="0"/>
                         <a:t>2. </a:t>
                       </a:r>
                       <a:r>
-                        <a:rPr lang="en-US" baseline="0" dirty="0"/>
-                        <a:t> Represent information as data; interpret data as information</a:t>
+                        <a:rPr lang="en-US" sz="2000" baseline="0" dirty="0"/>
+                        <a:t> Represent information as data; interpret data as information.</a:t>
                       </a:r>
-                      <a:endParaRPr lang="en-US" dirty="0"/>
+                      <a:endParaRPr lang="en-US" sz="2000" dirty="0"/>
                     </a:p>
                   </a:txBody>
                   <a:tcPr/>
@@ -14766,14 +14768,14 @@
                     <a:lstStyle/>
                     <a:p>
                       <a:r>
-                        <a:rPr lang="en-US" dirty="0"/>
+                        <a:rPr lang="en-US" sz="2000" dirty="0"/>
                         <a:t>3. Use contracts and purpose statements to specify the intended</a:t>
                       </a:r>
                       <a:r>
-                        <a:rPr lang="en-US" baseline="0" dirty="0"/>
-                        <a:t> behavior of your functions and methods</a:t>
+                        <a:rPr lang="en-US" sz="2000" baseline="0" dirty="0"/>
+                        <a:t> behavior of your functions and methods.</a:t>
                       </a:r>
-                      <a:endParaRPr lang="en-US" dirty="0"/>
+                      <a:endParaRPr lang="en-US" sz="2000" dirty="0"/>
                     </a:p>
                   </a:txBody>
                   <a:tcPr/>
@@ -14791,8 +14793,8 @@
                     <a:lstStyle/>
                     <a:p>
                       <a:r>
-                        <a:rPr lang="en-US" dirty="0"/>
-                        <a:t>4. Use invariants to limit your functions’ responsibility</a:t>
+                        <a:rPr lang="en-US" sz="2000" dirty="0"/>
+                        <a:t>4. Use invariants to limit your functions’ responsibility.</a:t>
                       </a:r>
                     </a:p>
                   </a:txBody>
@@ -14811,14 +14813,14 @@
                     <a:lstStyle/>
                     <a:p>
                       <a:r>
-                        <a:rPr lang="en-US" dirty="0"/>
+                        <a:rPr lang="en-US" sz="2000" dirty="0"/>
                         <a:t>5. Use functions</a:t>
                       </a:r>
                       <a:r>
-                        <a:rPr lang="en-US" baseline="0" dirty="0"/>
+                        <a:rPr lang="en-US" sz="2000" baseline="0" dirty="0"/>
                         <a:t> and methods that produce and consume values.</a:t>
                       </a:r>
-                      <a:endParaRPr lang="en-US" dirty="0"/>
+                      <a:endParaRPr lang="en-US" sz="2000" dirty="0"/>
                     </a:p>
                   </a:txBody>
                   <a:tcPr/>
@@ -14836,14 +14838,14 @@
                     <a:lstStyle/>
                     <a:p>
                       <a:r>
-                        <a:rPr lang="en-US" dirty="0"/>
+                        <a:rPr lang="en-US" sz="2000" dirty="0"/>
                         <a:t>6. Use state only to share information</a:t>
                       </a:r>
                       <a:r>
-                        <a:rPr lang="en-US" baseline="0" dirty="0"/>
+                        <a:rPr lang="en-US" sz="2000" baseline="0" dirty="0"/>
                         <a:t> between distant parts of the program.</a:t>
                       </a:r>
-                      <a:endParaRPr lang="en-US" dirty="0"/>
+                      <a:endParaRPr lang="en-US" sz="2000" dirty="0"/>
                     </a:p>
                   </a:txBody>
                   <a:tcPr/>
@@ -14861,14 +14863,14 @@
                     <a:lstStyle/>
                     <a:p>
                       <a:r>
-                        <a:rPr lang="en-US" dirty="0"/>
+                        <a:rPr lang="en-US" sz="2000" dirty="0"/>
                         <a:t>7. Use interfaces</a:t>
                       </a:r>
                       <a:r>
-                        <a:rPr lang="en-US" baseline="0" dirty="0"/>
+                        <a:rPr lang="en-US" sz="2000" baseline="0" dirty="0"/>
                         <a:t> to limit dependencies between different parts of your program.</a:t>
                       </a:r>
-                      <a:endParaRPr lang="en-US" dirty="0"/>
+                      <a:endParaRPr lang="en-US" sz="2000" dirty="0"/>
                     </a:p>
                   </a:txBody>
                   <a:tcPr/>

</xml_diff>